<commit_message>
improve docu and prese
</commit_message>
<xml_diff>
--- a/Diagrams/presentation.pptx
+++ b/Diagrams/presentation.pptx
@@ -4081,6 +4081,10 @@
             <a:r>
               <a:rPr lang="en-GB" b="1" i="1" dirty="0" err="1"/>
               <a:t>ChatBoxController</a:t>
+            </a:r>
+            <a:r>
+              <a:rPr lang="en-GB" b="1" i="1" dirty="0"/>
+              <a:t> – line 143</a:t>
             </a:r>
             <a:r>
               <a:rPr lang="en-GB" dirty="0"/>

</xml_diff>